<commit_message>
commiting edits to powerpoint presentation
</commit_message>
<xml_diff>
--- a/Ames_Housing_Project_Presentation.pptx
+++ b/Ames_Housing_Project_Presentation.pptx
@@ -9,11 +9,14 @@
     <p:sldId id="257" r:id="rId3"/>
     <p:sldId id="258" r:id="rId4"/>
     <p:sldId id="259" r:id="rId5"/>
-    <p:sldId id="260" r:id="rId6"/>
-    <p:sldId id="263" r:id="rId7"/>
-    <p:sldId id="264" r:id="rId8"/>
-    <p:sldId id="261" r:id="rId9"/>
-    <p:sldId id="262" r:id="rId10"/>
+    <p:sldId id="267" r:id="rId6"/>
+    <p:sldId id="260" r:id="rId7"/>
+    <p:sldId id="263" r:id="rId8"/>
+    <p:sldId id="264" r:id="rId9"/>
+    <p:sldId id="261" r:id="rId10"/>
+    <p:sldId id="262" r:id="rId11"/>
+    <p:sldId id="265" r:id="rId12"/>
+    <p:sldId id="266" r:id="rId13"/>
   </p:sldIdLst>
   <p:sldSz cx="12192000" cy="6858000"/>
   <p:notesSz cx="6858000" cy="9144000"/>
@@ -3378,7 +3381,10 @@
           <a:bodyPr/>
           <a:lstStyle/>
           <a:p>
-            <a:endParaRPr lang="en-US"/>
+            <a:r>
+              <a:rPr lang="en-US" dirty="0"/>
+              <a:t>(Add Ames, Iowa background photo)</a:t>
+            </a:r>
           </a:p>
         </p:txBody>
       </p:sp>
@@ -3386,6 +3392,343 @@
     <p:extLst>
       <p:ext uri="{BB962C8B-B14F-4D97-AF65-F5344CB8AC3E}">
         <p14:creationId xmlns:p14="http://schemas.microsoft.com/office/powerpoint/2010/main" val="3826248684"/>
+      </p:ext>
+    </p:extLst>
+  </p:cSld>
+  <p:clrMapOvr>
+    <a:masterClrMapping/>
+  </p:clrMapOvr>
+</p:sld>
+</file>
+
+<file path=ppt/slides/slide10.xml><?xml version="1.0" encoding="utf-8"?>
+<p:sld xmlns:a="http://schemas.openxmlformats.org/drawingml/2006/main" xmlns:r="http://schemas.openxmlformats.org/officeDocument/2006/relationships" xmlns:p="http://schemas.openxmlformats.org/presentationml/2006/main">
+  <p:cSld>
+    <p:spTree>
+      <p:nvGrpSpPr>
+        <p:cNvPr id="1" name=""/>
+        <p:cNvGrpSpPr/>
+        <p:nvPr/>
+      </p:nvGrpSpPr>
+      <p:grpSpPr>
+        <a:xfrm>
+          <a:off x="0" y="0"/>
+          <a:ext cx="0" cy="0"/>
+          <a:chOff x="0" y="0"/>
+          <a:chExt cx="0" cy="0"/>
+        </a:xfrm>
+      </p:grpSpPr>
+      <p:sp>
+        <p:nvSpPr>
+          <p:cNvPr id="2" name="Title 1">
+            <a:extLst>
+              <a:ext uri="{FF2B5EF4-FFF2-40B4-BE49-F238E27FC236}">
+                <a16:creationId xmlns:a16="http://schemas.microsoft.com/office/drawing/2014/main" id="{4F04B741-627B-A993-7B96-1CFFB8638CDD}"/>
+              </a:ext>
+            </a:extLst>
+          </p:cNvPr>
+          <p:cNvSpPr>
+            <a:spLocks noGrp="1"/>
+          </p:cNvSpPr>
+          <p:nvPr>
+            <p:ph type="title"/>
+          </p:nvPr>
+        </p:nvSpPr>
+        <p:spPr/>
+        <p:txBody>
+          <a:bodyPr/>
+          <a:lstStyle/>
+          <a:p>
+            <a:r>
+              <a:rPr lang="en-US" dirty="0"/>
+              <a:t>Final Model selection Section</a:t>
+            </a:r>
+          </a:p>
+        </p:txBody>
+      </p:sp>
+      <p:sp>
+        <p:nvSpPr>
+          <p:cNvPr id="3" name="Content Placeholder 2">
+            <a:extLst>
+              <a:ext uri="{FF2B5EF4-FFF2-40B4-BE49-F238E27FC236}">
+                <a16:creationId xmlns:a16="http://schemas.microsoft.com/office/drawing/2014/main" id="{CBEBB159-5ADF-4611-D580-8D26899DA560}"/>
+              </a:ext>
+            </a:extLst>
+          </p:cNvPr>
+          <p:cNvSpPr>
+            <a:spLocks noGrp="1"/>
+          </p:cNvSpPr>
+          <p:nvPr>
+            <p:ph idx="1"/>
+          </p:nvPr>
+        </p:nvSpPr>
+        <p:spPr/>
+        <p:txBody>
+          <a:bodyPr/>
+          <a:lstStyle/>
+          <a:p>
+            <a:r>
+              <a:rPr lang="en-US" dirty="0"/>
+              <a:t>Describe what models were tried (Linear, </a:t>
+            </a:r>
+            <a:r>
+              <a:rPr lang="en-US" dirty="0" err="1"/>
+              <a:t>RandomForest</a:t>
+            </a:r>
+            <a:r>
+              <a:rPr lang="en-US" dirty="0"/>
+              <a:t>, Support Vector Regression, </a:t>
+            </a:r>
+            <a:r>
+              <a:rPr lang="en-US" dirty="0" err="1"/>
+              <a:t>GradientBoosting</a:t>
+            </a:r>
+            <a:r>
+              <a:rPr lang="en-US" dirty="0"/>
+              <a:t>)</a:t>
+            </a:r>
+          </a:p>
+          <a:p>
+            <a:r>
+              <a:rPr lang="en-US" dirty="0"/>
+              <a:t>Found that </a:t>
+            </a:r>
+            <a:r>
+              <a:rPr lang="en-US" dirty="0" err="1"/>
+              <a:t>GradientBoosting</a:t>
+            </a:r>
+            <a:r>
+              <a:rPr lang="en-US" dirty="0"/>
+              <a:t> was the best model with R^2 of ~89%</a:t>
+            </a:r>
+          </a:p>
+          <a:p>
+            <a:r>
+              <a:rPr lang="en-US" dirty="0"/>
+              <a:t>Performed </a:t>
+            </a:r>
+            <a:r>
+              <a:rPr lang="en-US" dirty="0" err="1"/>
+              <a:t>GridSearchCV</a:t>
+            </a:r>
+            <a:r>
+              <a:rPr lang="en-US" dirty="0"/>
+              <a:t> to tune hyperparameters for our best model</a:t>
+            </a:r>
+          </a:p>
+          <a:p>
+            <a:endParaRPr lang="en-US" dirty="0"/>
+          </a:p>
+          <a:p>
+            <a:endParaRPr lang="en-US" dirty="0"/>
+          </a:p>
+        </p:txBody>
+      </p:sp>
+    </p:spTree>
+    <p:extLst>
+      <p:ext uri="{BB962C8B-B14F-4D97-AF65-F5344CB8AC3E}">
+        <p14:creationId xmlns:p14="http://schemas.microsoft.com/office/powerpoint/2010/main" val="990921834"/>
+      </p:ext>
+    </p:extLst>
+  </p:cSld>
+  <p:clrMapOvr>
+    <a:masterClrMapping/>
+  </p:clrMapOvr>
+</p:sld>
+</file>
+
+<file path=ppt/slides/slide11.xml><?xml version="1.0" encoding="utf-8"?>
+<p:sld xmlns:a="http://schemas.openxmlformats.org/drawingml/2006/main" xmlns:r="http://schemas.openxmlformats.org/officeDocument/2006/relationships" xmlns:p="http://schemas.openxmlformats.org/presentationml/2006/main">
+  <p:cSld>
+    <p:spTree>
+      <p:nvGrpSpPr>
+        <p:cNvPr id="1" name=""/>
+        <p:cNvGrpSpPr/>
+        <p:nvPr/>
+      </p:nvGrpSpPr>
+      <p:grpSpPr>
+        <a:xfrm>
+          <a:off x="0" y="0"/>
+          <a:ext cx="0" cy="0"/>
+          <a:chOff x="0" y="0"/>
+          <a:chExt cx="0" cy="0"/>
+        </a:xfrm>
+      </p:grpSpPr>
+      <p:sp>
+        <p:nvSpPr>
+          <p:cNvPr id="2" name="Title 1">
+            <a:extLst>
+              <a:ext uri="{FF2B5EF4-FFF2-40B4-BE49-F238E27FC236}">
+                <a16:creationId xmlns:a16="http://schemas.microsoft.com/office/drawing/2014/main" id="{D6D9643A-08FE-4ADB-464F-B6EAAABC8CFA}"/>
+              </a:ext>
+            </a:extLst>
+          </p:cNvPr>
+          <p:cNvSpPr>
+            <a:spLocks noGrp="1"/>
+          </p:cNvSpPr>
+          <p:nvPr>
+            <p:ph type="title"/>
+          </p:nvPr>
+        </p:nvSpPr>
+        <p:spPr/>
+        <p:txBody>
+          <a:bodyPr/>
+          <a:lstStyle/>
+          <a:p>
+            <a:r>
+              <a:rPr lang="en-US" dirty="0"/>
+              <a:t>Sample House Sale </a:t>
+            </a:r>
+          </a:p>
+        </p:txBody>
+      </p:sp>
+      <p:sp>
+        <p:nvSpPr>
+          <p:cNvPr id="3" name="Content Placeholder 2">
+            <a:extLst>
+              <a:ext uri="{FF2B5EF4-FFF2-40B4-BE49-F238E27FC236}">
+                <a16:creationId xmlns:a16="http://schemas.microsoft.com/office/drawing/2014/main" id="{26B5C722-24F7-C9AF-F5BB-FA9AFD2AF30F}"/>
+              </a:ext>
+            </a:extLst>
+          </p:cNvPr>
+          <p:cNvSpPr>
+            <a:spLocks noGrp="1"/>
+          </p:cNvSpPr>
+          <p:nvPr>
+            <p:ph idx="1"/>
+          </p:nvPr>
+        </p:nvSpPr>
+        <p:spPr/>
+        <p:txBody>
+          <a:bodyPr/>
+          <a:lstStyle/>
+          <a:p>
+            <a:r>
+              <a:rPr lang="en-US" dirty="0"/>
+              <a:t>Want to predict price for 2019 and 2021</a:t>
+            </a:r>
+          </a:p>
+          <a:p>
+            <a:endParaRPr lang="en-US" dirty="0"/>
+          </a:p>
+        </p:txBody>
+      </p:sp>
+    </p:spTree>
+    <p:extLst>
+      <p:ext uri="{BB962C8B-B14F-4D97-AF65-F5344CB8AC3E}">
+        <p14:creationId xmlns:p14="http://schemas.microsoft.com/office/powerpoint/2010/main" val="3849151842"/>
+      </p:ext>
+    </p:extLst>
+  </p:cSld>
+  <p:clrMapOvr>
+    <a:masterClrMapping/>
+  </p:clrMapOvr>
+</p:sld>
+</file>
+
+<file path=ppt/slides/slide12.xml><?xml version="1.0" encoding="utf-8"?>
+<p:sld xmlns:a="http://schemas.openxmlformats.org/drawingml/2006/main" xmlns:r="http://schemas.openxmlformats.org/officeDocument/2006/relationships" xmlns:p="http://schemas.openxmlformats.org/presentationml/2006/main">
+  <p:cSld>
+    <p:spTree>
+      <p:nvGrpSpPr>
+        <p:cNvPr id="1" name=""/>
+        <p:cNvGrpSpPr/>
+        <p:nvPr/>
+      </p:nvGrpSpPr>
+      <p:grpSpPr>
+        <a:xfrm>
+          <a:off x="0" y="0"/>
+          <a:ext cx="0" cy="0"/>
+          <a:chOff x="0" y="0"/>
+          <a:chExt cx="0" cy="0"/>
+        </a:xfrm>
+      </p:grpSpPr>
+      <p:sp>
+        <p:nvSpPr>
+          <p:cNvPr id="2" name="Title 1">
+            <a:extLst>
+              <a:ext uri="{FF2B5EF4-FFF2-40B4-BE49-F238E27FC236}">
+                <a16:creationId xmlns:a16="http://schemas.microsoft.com/office/drawing/2014/main" id="{25C0AEB2-E4AB-B65F-6BDB-FA67CEE8A98D}"/>
+              </a:ext>
+            </a:extLst>
+          </p:cNvPr>
+          <p:cNvSpPr>
+            <a:spLocks noGrp="1"/>
+          </p:cNvSpPr>
+          <p:nvPr>
+            <p:ph type="title"/>
+          </p:nvPr>
+        </p:nvSpPr>
+        <p:spPr/>
+        <p:txBody>
+          <a:bodyPr/>
+          <a:lstStyle/>
+          <a:p>
+            <a:r>
+              <a:rPr lang="en-US" dirty="0"/>
+              <a:t>Conclusion</a:t>
+            </a:r>
+          </a:p>
+        </p:txBody>
+      </p:sp>
+      <p:sp>
+        <p:nvSpPr>
+          <p:cNvPr id="3" name="Content Placeholder 2">
+            <a:extLst>
+              <a:ext uri="{FF2B5EF4-FFF2-40B4-BE49-F238E27FC236}">
+                <a16:creationId xmlns:a16="http://schemas.microsoft.com/office/drawing/2014/main" id="{F79D7599-E5C0-175A-0EEB-EB6B17872D65}"/>
+              </a:ext>
+            </a:extLst>
+          </p:cNvPr>
+          <p:cNvSpPr>
+            <a:spLocks noGrp="1"/>
+          </p:cNvSpPr>
+          <p:nvPr>
+            <p:ph idx="1"/>
+          </p:nvPr>
+        </p:nvSpPr>
+        <p:spPr/>
+        <p:txBody>
+          <a:bodyPr/>
+          <a:lstStyle/>
+          <a:p>
+            <a:r>
+              <a:rPr lang="en-US" dirty="0"/>
+              <a:t>How did the pandemic affect house prices and the </a:t>
+            </a:r>
+            <a:r>
+              <a:rPr lang="en-US" dirty="0" err="1"/>
+              <a:t>housemarket</a:t>
+            </a:r>
+            <a:r>
+              <a:rPr lang="en-US" dirty="0"/>
+              <a:t> in Ames, Iowa</a:t>
+            </a:r>
+          </a:p>
+          <a:p>
+            <a:r>
+              <a:rPr lang="en-US" dirty="0"/>
+              <a:t>What locations would Real Estate Agents want to advertise as good locations for people coming from out of town</a:t>
+            </a:r>
+          </a:p>
+          <a:p>
+            <a:r>
+              <a:rPr lang="en-US" dirty="0"/>
+              <a:t>For some out of towners moving from another city what are the best locations for them in terms of convenience and price of the homes (particularly for remote workers)</a:t>
+            </a:r>
+          </a:p>
+          <a:p>
+            <a:endParaRPr lang="en-US" dirty="0"/>
+          </a:p>
+          <a:p>
+            <a:endParaRPr lang="en-US" dirty="0"/>
+          </a:p>
+        </p:txBody>
+      </p:sp>
+    </p:spTree>
+    <p:extLst>
+      <p:ext uri="{BB962C8B-B14F-4D97-AF65-F5344CB8AC3E}">
+        <p14:creationId xmlns:p14="http://schemas.microsoft.com/office/powerpoint/2010/main" val="3021288419"/>
       </p:ext>
     </p:extLst>
   </p:cSld>
@@ -3435,7 +3778,7 @@
           <a:p>
             <a:r>
               <a:rPr lang="en-US" dirty="0"/>
-              <a:t>Background </a:t>
+              <a:t>Introduction</a:t>
             </a:r>
           </a:p>
         </p:txBody>
@@ -3465,13 +3808,13 @@
           <a:p>
             <a:r>
               <a:rPr lang="en-US" sz="1600" dirty="0"/>
-              <a:t>Who we are: consultant for real estate firm</a:t>
+              <a:t>Who we are: a consultant for real estate firm</a:t>
             </a:r>
           </a:p>
           <a:p>
             <a:r>
               <a:rPr lang="en-US" sz="1600" dirty="0"/>
-              <a:t>Clients would be people moving from a larger city to a smaller town like Ames to save on housing costs, but work remotely</a:t>
+              <a:t>Real Estate firm clients would be people moving from a larger city to a smaller town like Ames to save on housing costs, but work remotely</a:t>
             </a:r>
           </a:p>
           <a:p>
@@ -3513,6 +3856,17 @@
               <a:rPr lang="en-US" sz="1600" dirty="0"/>
               <a:t>Proximity to which services impact sale price the most to better advise their clients </a:t>
             </a:r>
+          </a:p>
+          <a:p>
+            <a:pPr lvl="1"/>
+            <a:r>
+              <a:rPr lang="en-US" sz="1600" dirty="0"/>
+              <a:t>Wants to understand where to position advertising</a:t>
+            </a:r>
+          </a:p>
+          <a:p>
+            <a:pPr lvl="1"/>
+            <a:endParaRPr lang="en-US" sz="1600" dirty="0"/>
           </a:p>
           <a:p>
             <a:pPr lvl="1"/>
@@ -3596,7 +3950,9 @@
         </p:nvSpPr>
         <p:spPr/>
         <p:txBody>
-          <a:bodyPr/>
+          <a:bodyPr>
+            <a:normAutofit fontScale="85000" lnSpcReduction="20000"/>
+          </a:bodyPr>
           <a:lstStyle/>
           <a:p>
             <a:r>
@@ -3654,6 +4010,59 @@
               <a:rPr lang="en-US" dirty="0"/>
               <a:t>Discuss which years were chosen and why (2019, 2021)</a:t>
             </a:r>
+          </a:p>
+          <a:p>
+            <a:r>
+              <a:rPr lang="en-US" dirty="0"/>
+              <a:t>Visualizations:</a:t>
+            </a:r>
+          </a:p>
+          <a:p>
+            <a:pPr lvl="1"/>
+            <a:r>
+              <a:rPr lang="en-US" dirty="0"/>
+              <a:t>Show visualizations for trends in the housing prices and the number of homes sold per month</a:t>
+            </a:r>
+          </a:p>
+          <a:p>
+            <a:pPr lvl="1"/>
+            <a:r>
+              <a:rPr lang="en-US" dirty="0"/>
+              <a:t>Show all Area/SF fields and engineered fields in one bar chart</a:t>
+            </a:r>
+          </a:p>
+          <a:p>
+            <a:pPr lvl="1"/>
+            <a:r>
+              <a:rPr lang="en-US" dirty="0"/>
+              <a:t>Show frequency table of “Has_” fields</a:t>
+            </a:r>
+          </a:p>
+          <a:p>
+            <a:pPr lvl="1"/>
+            <a:r>
+              <a:rPr lang="en-US" dirty="0"/>
+              <a:t>Show Correlations using heatmap to show which fields are more correlated to </a:t>
+            </a:r>
+            <a:r>
+              <a:rPr lang="en-US" dirty="0" err="1"/>
+              <a:t>SalePrice</a:t>
+            </a:r>
+            <a:endParaRPr lang="en-US" dirty="0"/>
+          </a:p>
+          <a:p>
+            <a:pPr lvl="1"/>
+            <a:r>
+              <a:rPr lang="en-US" dirty="0"/>
+              <a:t>Data Visualization of the important fields from Real Estate data for 2019, 2021</a:t>
+            </a:r>
+          </a:p>
+          <a:p>
+            <a:pPr lvl="1"/>
+            <a:endParaRPr lang="en-US" dirty="0"/>
+          </a:p>
+          <a:p>
+            <a:endParaRPr lang="en-US" dirty="0"/>
           </a:p>
           <a:p>
             <a:endParaRPr lang="en-US" dirty="0"/>
@@ -3769,6 +4178,29 @@
             </a:r>
           </a:p>
           <a:p>
+            <a:r>
+              <a:rPr lang="en-US" dirty="0"/>
+              <a:t>Visualizations:</a:t>
+            </a:r>
+          </a:p>
+          <a:p>
+            <a:pPr lvl="1"/>
+            <a:r>
+              <a:rPr lang="en-US" dirty="0"/>
+              <a:t>Map of the businesses selected</a:t>
+            </a:r>
+          </a:p>
+          <a:p>
+            <a:pPr lvl="1"/>
+            <a:endParaRPr lang="en-US" dirty="0"/>
+          </a:p>
+          <a:p>
+            <a:pPr marL="0" indent="0">
+              <a:buNone/>
+            </a:pPr>
+            <a:endParaRPr lang="en-US" dirty="0"/>
+          </a:p>
+          <a:p>
             <a:endParaRPr lang="en-US" dirty="0"/>
           </a:p>
         </p:txBody>
@@ -3808,7 +4240,7 @@
           <p:cNvPr id="2" name="Title 1">
             <a:extLst>
               <a:ext uri="{FF2B5EF4-FFF2-40B4-BE49-F238E27FC236}">
-                <a16:creationId xmlns:a16="http://schemas.microsoft.com/office/drawing/2014/main" id="{64B34513-6B9E-E9F6-70DB-3E1BAA8439B1}"/>
+                <a16:creationId xmlns:a16="http://schemas.microsoft.com/office/drawing/2014/main" id="{BA37A93C-7117-F49E-CE67-2AC72EF5CAE2}"/>
               </a:ext>
             </a:extLst>
           </p:cNvPr>
@@ -3824,180 +4256,43 @@
           <a:bodyPr/>
           <a:lstStyle/>
           <a:p>
-            <a:r>
-              <a:rPr lang="en-US" dirty="0" err="1"/>
-              <a:t>LatLong</a:t>
-            </a:r>
-            <a:r>
-              <a:rPr lang="en-US" dirty="0"/>
-              <a:t> and Drive Time section </a:t>
-            </a:r>
-          </a:p>
-        </p:txBody>
-      </p:sp>
-      <p:sp>
-        <p:nvSpPr>
-          <p:cNvPr id="3" name="Content Placeholder 2">
-            <a:extLst>
-              <a:ext uri="{FF2B5EF4-FFF2-40B4-BE49-F238E27FC236}">
-                <a16:creationId xmlns:a16="http://schemas.microsoft.com/office/drawing/2014/main" id="{43FC4303-4881-B5CF-33E2-B7C1C231B6EF}"/>
-              </a:ext>
-            </a:extLst>
-          </p:cNvPr>
-          <p:cNvSpPr>
-            <a:spLocks noGrp="1"/>
-          </p:cNvSpPr>
+            <a:endParaRPr lang="en-US"/>
+          </a:p>
+        </p:txBody>
+      </p:sp>
+      <p:pic>
+        <p:nvPicPr>
+          <p:cNvPr id="5" name="Content Placeholder 4" descr="A map of a city with many cities&#10;&#10;Description automatically generated">
+            <a:extLst>
+              <a:ext uri="{FF2B5EF4-FFF2-40B4-BE49-F238E27FC236}">
+                <a16:creationId xmlns:a16="http://schemas.microsoft.com/office/drawing/2014/main" id="{F4D51016-38FF-729F-FED1-A64B1BCE019C}"/>
+              </a:ext>
+            </a:extLst>
+          </p:cNvPr>
+          <p:cNvPicPr>
+            <a:picLocks noGrp="1" noChangeAspect="1"/>
+          </p:cNvPicPr>
           <p:nvPr>
             <p:ph idx="1"/>
           </p:nvPr>
-        </p:nvSpPr>
-        <p:spPr/>
-        <p:txBody>
-          <a:bodyPr>
-            <a:normAutofit fontScale="92500"/>
-          </a:bodyPr>
-          <a:lstStyle/>
-          <a:p>
-            <a:r>
-              <a:rPr lang="en-US" dirty="0"/>
-              <a:t>Describe source and method for calculating </a:t>
-            </a:r>
-            <a:r>
-              <a:rPr lang="en-US" dirty="0" err="1"/>
-              <a:t>LatLongs</a:t>
-            </a:r>
-            <a:r>
-              <a:rPr lang="en-US" dirty="0"/>
-              <a:t>, drive time and min point to point distances (OSMR, </a:t>
-            </a:r>
-            <a:r>
-              <a:rPr lang="en-US" dirty="0" err="1"/>
-              <a:t>Nominatim</a:t>
-            </a:r>
-            <a:r>
-              <a:rPr lang="en-US" dirty="0"/>
-              <a:t>, </a:t>
-            </a:r>
-            <a:r>
-              <a:rPr lang="en-US" dirty="0" err="1"/>
-              <a:t>GeoApify</a:t>
-            </a:r>
-            <a:r>
-              <a:rPr lang="en-US" dirty="0"/>
-              <a:t>, </a:t>
-            </a:r>
-            <a:r>
-              <a:rPr lang="en-US" dirty="0" err="1"/>
-              <a:t>reverselookup</a:t>
-            </a:r>
-            <a:r>
-              <a:rPr lang="en-US" dirty="0"/>
-              <a:t> </a:t>
-            </a:r>
-            <a:r>
-              <a:rPr lang="en-US" dirty="0" err="1"/>
-              <a:t>etc</a:t>
-            </a:r>
-            <a:r>
-              <a:rPr lang="en-US" dirty="0"/>
-              <a:t>)</a:t>
-            </a:r>
-          </a:p>
-          <a:p>
-            <a:r>
-              <a:rPr lang="en-US" dirty="0"/>
-              <a:t>Talk about why we used drive time as opposed to driving distance</a:t>
-            </a:r>
-          </a:p>
-          <a:p>
-            <a:pPr lvl="1"/>
-            <a:r>
-              <a:rPr lang="en-US" dirty="0"/>
-              <a:t>Using preliminary descriptive linear models, time presented a higher R^2 than driving distance. This is probably because drive time takes road conditions into account (number of traffic lights, stop signs, traffic conditions, street directions </a:t>
-            </a:r>
-            <a:r>
-              <a:rPr lang="en-US" dirty="0" err="1"/>
-              <a:t>etc</a:t>
-            </a:r>
-            <a:r>
-              <a:rPr lang="en-US" dirty="0"/>
-              <a:t>)</a:t>
-            </a:r>
-          </a:p>
-          <a:p>
-            <a:r>
-              <a:rPr lang="en-US" dirty="0"/>
-              <a:t>Discuss methodology for </a:t>
-            </a:r>
-            <a:r>
-              <a:rPr lang="en-US" dirty="0" err="1"/>
-              <a:t>latlong</a:t>
-            </a:r>
-            <a:r>
-              <a:rPr lang="en-US" dirty="0"/>
-              <a:t> and drive time lookup</a:t>
-            </a:r>
-          </a:p>
-          <a:p>
-            <a:pPr lvl="1"/>
-            <a:r>
-              <a:rPr lang="en-US" dirty="0"/>
-              <a:t>First found </a:t>
-            </a:r>
-            <a:r>
-              <a:rPr lang="en-US" dirty="0" err="1"/>
-              <a:t>Latlongs</a:t>
-            </a:r>
-            <a:r>
-              <a:rPr lang="en-US" dirty="0"/>
-              <a:t>. The </a:t>
-            </a:r>
-            <a:r>
-              <a:rPr lang="en-US" dirty="0" err="1"/>
-              <a:t>Latlongs</a:t>
-            </a:r>
-            <a:r>
-              <a:rPr lang="en-US" dirty="0"/>
-              <a:t> found were verified using </a:t>
-            </a:r>
-            <a:r>
-              <a:rPr lang="en-US" dirty="0" err="1"/>
-              <a:t>reverselookup</a:t>
-            </a:r>
-            <a:r>
-              <a:rPr lang="en-US" dirty="0"/>
-              <a:t>. Manually corrected any discrepancies. Then looked up driving times and driving distances through an API</a:t>
-            </a:r>
-          </a:p>
-          <a:p>
-            <a:pPr lvl="1"/>
-            <a:r>
-              <a:rPr lang="en-US" dirty="0"/>
-              <a:t>List of resource used: OSMR, </a:t>
-            </a:r>
-            <a:r>
-              <a:rPr lang="en-US" dirty="0" err="1"/>
-              <a:t>Nominatim</a:t>
-            </a:r>
-            <a:r>
-              <a:rPr lang="en-US" dirty="0"/>
-              <a:t>, </a:t>
-            </a:r>
-            <a:r>
-              <a:rPr lang="en-US" dirty="0" err="1"/>
-              <a:t>GeoApify</a:t>
-            </a:r>
-            <a:r>
-              <a:rPr lang="en-US" dirty="0"/>
-              <a:t> and Google Maps.</a:t>
-            </a:r>
-          </a:p>
-        </p:txBody>
-      </p:sp>
+        </p:nvPicPr>
+        <p:blipFill>
+          <a:blip r:embed="rId2"/>
+          <a:stretch>
+            <a:fillRect/>
+          </a:stretch>
+        </p:blipFill>
+        <p:spPr>
+          <a:xfrm>
+            <a:off x="1829119" y="262493"/>
+            <a:ext cx="7852627" cy="6333013"/>
+          </a:xfrm>
+        </p:spPr>
+      </p:pic>
     </p:spTree>
     <p:extLst>
       <p:ext uri="{BB962C8B-B14F-4D97-AF65-F5344CB8AC3E}">
-        <p14:creationId xmlns:p14="http://schemas.microsoft.com/office/powerpoint/2010/main" val="194804399"/>
+        <p14:creationId xmlns:p14="http://schemas.microsoft.com/office/powerpoint/2010/main" val="1127569185"/>
       </p:ext>
     </p:extLst>
   </p:cSld>
@@ -4029,7 +4324,7 @@
           <p:cNvPr id="2" name="Title 1">
             <a:extLst>
               <a:ext uri="{FF2B5EF4-FFF2-40B4-BE49-F238E27FC236}">
-                <a16:creationId xmlns:a16="http://schemas.microsoft.com/office/drawing/2014/main" id="{652CD62F-6D7E-DE84-C43A-DBFA2B8073B7}"/>
+                <a16:creationId xmlns:a16="http://schemas.microsoft.com/office/drawing/2014/main" id="{64B34513-6B9E-E9F6-70DB-3E1BAA8439B1}"/>
               </a:ext>
             </a:extLst>
           </p:cNvPr>
@@ -4046,8 +4341,12 @@
           <a:lstStyle/>
           <a:p>
             <a:r>
-              <a:rPr lang="en-US" dirty="0"/>
-              <a:t>Feature Engineering Section</a:t>
+              <a:rPr lang="en-US" dirty="0" err="1"/>
+              <a:t>LatLong</a:t>
+            </a:r>
+            <a:r>
+              <a:rPr lang="en-US" dirty="0"/>
+              <a:t> and Drive Time section </a:t>
             </a:r>
           </a:p>
         </p:txBody>
@@ -4057,7 +4356,7 @@
           <p:cNvPr id="3" name="Content Placeholder 2">
             <a:extLst>
               <a:ext uri="{FF2B5EF4-FFF2-40B4-BE49-F238E27FC236}">
-                <a16:creationId xmlns:a16="http://schemas.microsoft.com/office/drawing/2014/main" id="{26347C1C-8F3F-2E0A-2B2F-5C61ED015EF4}"/>
+                <a16:creationId xmlns:a16="http://schemas.microsoft.com/office/drawing/2014/main" id="{43FC4303-4881-B5CF-33E2-B7C1C231B6EF}"/>
               </a:ext>
             </a:extLst>
           </p:cNvPr>
@@ -4070,40 +4369,50 @@
         </p:nvSpPr>
         <p:spPr/>
         <p:txBody>
-          <a:bodyPr/>
-          <a:lstStyle/>
-          <a:p>
-            <a:r>
-              <a:rPr lang="en-US" dirty="0"/>
-              <a:t>What fields we created and their significance (“Has_” Booleans, </a:t>
+          <a:bodyPr>
+            <a:normAutofit fontScale="92500"/>
+          </a:bodyPr>
+          <a:lstStyle/>
+          <a:p>
+            <a:r>
+              <a:rPr lang="en-US" dirty="0"/>
+              <a:t>Describe source and method for calculating </a:t>
             </a:r>
             <a:r>
               <a:rPr lang="en-US" dirty="0" err="1"/>
-              <a:t>TotalArea</a:t>
-            </a:r>
-            <a:r>
-              <a:rPr lang="en-US" dirty="0"/>
-              <a:t> and </a:t>
+              <a:t>LatLongs</a:t>
+            </a:r>
+            <a:r>
+              <a:rPr lang="en-US" dirty="0"/>
+              <a:t>, drive time and min point to point distances (OSMR, </a:t>
             </a:r>
             <a:r>
               <a:rPr lang="en-US" dirty="0" err="1"/>
-              <a:t>TotalArea</a:t>
-            </a:r>
-            <a:r>
-              <a:rPr lang="en-US" dirty="0"/>
-              <a:t> with Garage, combined Ext1/2 field into dummy set of cols, dummies for </a:t>
+              <a:t>Nominatim</a:t>
+            </a:r>
+            <a:r>
+              <a:rPr lang="en-US" dirty="0"/>
+              <a:t>, </a:t>
             </a:r>
             <a:r>
               <a:rPr lang="en-US" dirty="0" err="1"/>
-              <a:t>HouseStyle</a:t>
-            </a:r>
-            <a:r>
-              <a:rPr lang="en-US" dirty="0"/>
-              <a:t> and </a:t>
+              <a:t>GeoApify</a:t>
+            </a:r>
+            <a:r>
+              <a:rPr lang="en-US" dirty="0"/>
+              <a:t>, </a:t>
             </a:r>
             <a:r>
               <a:rPr lang="en-US" dirty="0" err="1"/>
-              <a:t>GarageType</a:t>
+              <a:t>reverselookup</a:t>
+            </a:r>
+            <a:r>
+              <a:rPr lang="en-US" dirty="0"/>
+              <a:t> </a:t>
+            </a:r>
+            <a:r>
+              <a:rPr lang="en-US" dirty="0" err="1"/>
+              <a:t>etc</a:t>
             </a:r>
             <a:r>
               <a:rPr lang="en-US" dirty="0"/>
@@ -4113,33 +4422,98 @@
           <a:p>
             <a:r>
               <a:rPr lang="en-US" dirty="0"/>
-              <a:t>Talk about reengineered times and distances. Minimum distances based on geography.</a:t>
+              <a:t>Talk about why we used drive time as opposed to driving distance</a:t>
             </a:r>
           </a:p>
           <a:p>
             <a:pPr lvl="1"/>
             <a:r>
               <a:rPr lang="en-US" dirty="0"/>
-              <a:t>Closest_5 field, convenience, centrality, </a:t>
+              <a:t>Using preliminary descriptive linear models, time presented a higher R^2 than driving distance. This is probably because drive time takes road conditions into account (number of traffic lights, stop signs, traffic conditions, street directions </a:t>
             </a:r>
             <a:r>
               <a:rPr lang="en-US" dirty="0" err="1"/>
-              <a:t>num_biz</a:t>
-            </a:r>
-            <a:r>
-              <a:rPr lang="en-US" dirty="0"/>
-              <a:t> within 180s/480</a:t>
-            </a:r>
-          </a:p>
-          <a:p>
-            <a:endParaRPr lang="en-US" dirty="0"/>
+              <a:t>etc</a:t>
+            </a:r>
+            <a:r>
+              <a:rPr lang="en-US" dirty="0"/>
+              <a:t>)</a:t>
+            </a:r>
+          </a:p>
+          <a:p>
+            <a:r>
+              <a:rPr lang="en-US" dirty="0"/>
+              <a:t>Discuss methodology for </a:t>
+            </a:r>
+            <a:r>
+              <a:rPr lang="en-US" dirty="0" err="1"/>
+              <a:t>latlong</a:t>
+            </a:r>
+            <a:r>
+              <a:rPr lang="en-US" dirty="0"/>
+              <a:t> and drive time lookup</a:t>
+            </a:r>
+          </a:p>
+          <a:p>
+            <a:pPr lvl="1"/>
+            <a:r>
+              <a:rPr lang="en-US" dirty="0"/>
+              <a:t>First found </a:t>
+            </a:r>
+            <a:r>
+              <a:rPr lang="en-US" dirty="0" err="1"/>
+              <a:t>Latlongs</a:t>
+            </a:r>
+            <a:r>
+              <a:rPr lang="en-US" dirty="0"/>
+              <a:t>. The </a:t>
+            </a:r>
+            <a:r>
+              <a:rPr lang="en-US" dirty="0" err="1"/>
+              <a:t>Latlongs</a:t>
+            </a:r>
+            <a:r>
+              <a:rPr lang="en-US" dirty="0"/>
+              <a:t> found were verified using </a:t>
+            </a:r>
+            <a:r>
+              <a:rPr lang="en-US" dirty="0" err="1"/>
+              <a:t>reverselookup</a:t>
+            </a:r>
+            <a:r>
+              <a:rPr lang="en-US" dirty="0"/>
+              <a:t>. Manually corrected any discrepancies. Then looked up driving times and driving distances through an API</a:t>
+            </a:r>
+          </a:p>
+          <a:p>
+            <a:pPr lvl="1"/>
+            <a:r>
+              <a:rPr lang="en-US" dirty="0"/>
+              <a:t>List of resource used: OSMR, </a:t>
+            </a:r>
+            <a:r>
+              <a:rPr lang="en-US" dirty="0" err="1"/>
+              <a:t>Nominatim</a:t>
+            </a:r>
+            <a:r>
+              <a:rPr lang="en-US" dirty="0"/>
+              <a:t>, </a:t>
+            </a:r>
+            <a:r>
+              <a:rPr lang="en-US" dirty="0" err="1"/>
+              <a:t>GeoApify</a:t>
+            </a:r>
+            <a:r>
+              <a:rPr lang="en-US" dirty="0"/>
+              <a:t> and Google Maps.</a:t>
+            </a:r>
           </a:p>
         </p:txBody>
       </p:sp>
     </p:spTree>
     <p:extLst>
       <p:ext uri="{BB962C8B-B14F-4D97-AF65-F5344CB8AC3E}">
-        <p14:creationId xmlns:p14="http://schemas.microsoft.com/office/powerpoint/2010/main" val="48111887"/>
+        <p14:creationId xmlns:p14="http://schemas.microsoft.com/office/powerpoint/2010/main" val="194804399"/>
       </p:ext>
     </p:extLst>
   </p:cSld>
@@ -4171,7 +4545,7 @@
           <p:cNvPr id="2" name="Title 1">
             <a:extLst>
               <a:ext uri="{FF2B5EF4-FFF2-40B4-BE49-F238E27FC236}">
-                <a16:creationId xmlns:a16="http://schemas.microsoft.com/office/drawing/2014/main" id="{5FF212F9-ED1F-B0C6-B175-03809EACF9EF}"/>
+                <a16:creationId xmlns:a16="http://schemas.microsoft.com/office/drawing/2014/main" id="{652CD62F-6D7E-DE84-C43A-DBFA2B8073B7}"/>
               </a:ext>
             </a:extLst>
           </p:cNvPr>
@@ -4189,7 +4563,7 @@
           <a:p>
             <a:r>
               <a:rPr lang="en-US" dirty="0"/>
-              <a:t>Feature Selection Section</a:t>
+              <a:t>Feature Engineering Section</a:t>
             </a:r>
           </a:p>
         </p:txBody>
@@ -4199,7 +4573,7 @@
           <p:cNvPr id="3" name="Content Placeholder 2">
             <a:extLst>
               <a:ext uri="{FF2B5EF4-FFF2-40B4-BE49-F238E27FC236}">
-                <a16:creationId xmlns:a16="http://schemas.microsoft.com/office/drawing/2014/main" id="{710D60C1-E1B2-C39D-A3A9-6FDA797EBF25}"/>
+                <a16:creationId xmlns:a16="http://schemas.microsoft.com/office/drawing/2014/main" id="{26347C1C-8F3F-2E0A-2B2F-5C61ED015EF4}"/>
               </a:ext>
             </a:extLst>
           </p:cNvPr>
@@ -4217,29 +4591,11 @@
           <a:p>
             <a:r>
               <a:rPr lang="en-US" dirty="0"/>
-              <a:t>Methods used for feature selection (Lasso, VIF, SFS)</a:t>
-            </a:r>
-          </a:p>
-          <a:p>
-            <a:r>
-              <a:rPr lang="en-US" dirty="0"/>
-              <a:t>Due to multicollinearity issues, VIF and Lasso were unnecessary</a:t>
-            </a:r>
-          </a:p>
-          <a:p>
-            <a:r>
-              <a:rPr lang="en-US" dirty="0"/>
-              <a:t>Chose to use ensemble techniques that can handle multicollinearity</a:t>
-            </a:r>
-          </a:p>
-          <a:p>
-            <a:r>
-              <a:rPr lang="en-US" dirty="0"/>
-              <a:t>Thus SFS was used as a greedy process, both </a:t>
+              <a:t>What fields we created and their significance (“Has_” Booleans, </a:t>
             </a:r>
             <a:r>
               <a:rPr lang="en-US" dirty="0" err="1"/>
-              <a:t>fwd</a:t>
+              <a:t>TotalArea</a:t>
             </a:r>
             <a:r>
               <a:rPr lang="en-US" dirty="0"/>
@@ -4247,22 +4603,51 @@
             </a:r>
             <a:r>
               <a:rPr lang="en-US" dirty="0" err="1"/>
-              <a:t>bwd</a:t>
-            </a:r>
-            <a:r>
-              <a:rPr lang="en-US" dirty="0"/>
-              <a:t>, which resulted in 37 features selected for the final model</a:t>
-            </a:r>
-          </a:p>
-          <a:p>
-            <a:r>
-              <a:rPr lang="en-US" dirty="0"/>
-              <a:t>Describe the important features in some way using a diagram or list of correlation/</a:t>
+              <a:t>TotalArea</a:t>
+            </a:r>
+            <a:r>
+              <a:rPr lang="en-US" dirty="0"/>
+              <a:t> with Garage, combined Ext1/2 field into dummy set of cols, dummies for </a:t>
             </a:r>
             <a:r>
               <a:rPr lang="en-US" dirty="0" err="1"/>
-              <a:t>importances</a:t>
-            </a:r>
+              <a:t>HouseStyle</a:t>
+            </a:r>
+            <a:r>
+              <a:rPr lang="en-US" dirty="0"/>
+              <a:t> and </a:t>
+            </a:r>
+            <a:r>
+              <a:rPr lang="en-US" dirty="0" err="1"/>
+              <a:t>GarageType</a:t>
+            </a:r>
+            <a:r>
+              <a:rPr lang="en-US" dirty="0"/>
+              <a:t>)</a:t>
+            </a:r>
+          </a:p>
+          <a:p>
+            <a:r>
+              <a:rPr lang="en-US" dirty="0"/>
+              <a:t>Talk about reengineered times and distances. Minimum distances based on geography.</a:t>
+            </a:r>
+          </a:p>
+          <a:p>
+            <a:pPr lvl="1"/>
+            <a:r>
+              <a:rPr lang="en-US" dirty="0"/>
+              <a:t>Closest_5 field, convenience, centrality, </a:t>
+            </a:r>
+            <a:r>
+              <a:rPr lang="en-US" dirty="0" err="1"/>
+              <a:t>num_biz</a:t>
+            </a:r>
+            <a:r>
+              <a:rPr lang="en-US" dirty="0"/>
+              <a:t> within 180s/480</a:t>
+            </a:r>
+          </a:p>
+          <a:p>
             <a:endParaRPr lang="en-US" dirty="0"/>
           </a:p>
         </p:txBody>
@@ -4270,7 +4655,7 @@
     </p:spTree>
     <p:extLst>
       <p:ext uri="{BB962C8B-B14F-4D97-AF65-F5344CB8AC3E}">
-        <p14:creationId xmlns:p14="http://schemas.microsoft.com/office/powerpoint/2010/main" val="793378892"/>
+        <p14:creationId xmlns:p14="http://schemas.microsoft.com/office/powerpoint/2010/main" val="48111887"/>
       </p:ext>
     </p:extLst>
   </p:cSld>
@@ -4302,7 +4687,7 @@
           <p:cNvPr id="2" name="Title 1">
             <a:extLst>
               <a:ext uri="{FF2B5EF4-FFF2-40B4-BE49-F238E27FC236}">
-                <a16:creationId xmlns:a16="http://schemas.microsoft.com/office/drawing/2014/main" id="{A75C7817-1BFF-C9E7-63CC-91790F745067}"/>
+                <a16:creationId xmlns:a16="http://schemas.microsoft.com/office/drawing/2014/main" id="{5FF212F9-ED1F-B0C6-B175-03809EACF9EF}"/>
               </a:ext>
             </a:extLst>
           </p:cNvPr>
@@ -4320,7 +4705,7 @@
           <a:p>
             <a:r>
               <a:rPr lang="en-US" dirty="0"/>
-              <a:t>Compare 2019 to 2021</a:t>
+              <a:t>Feature Selection Section</a:t>
             </a:r>
           </a:p>
         </p:txBody>
@@ -4330,7 +4715,7 @@
           <p:cNvPr id="3" name="Content Placeholder 2">
             <a:extLst>
               <a:ext uri="{FF2B5EF4-FFF2-40B4-BE49-F238E27FC236}">
-                <a16:creationId xmlns:a16="http://schemas.microsoft.com/office/drawing/2014/main" id="{B97B878B-CD2C-B39F-AFE7-28C09C352DFB}"/>
+                <a16:creationId xmlns:a16="http://schemas.microsoft.com/office/drawing/2014/main" id="{710D60C1-E1B2-C39D-A3A9-6FDA797EBF25}"/>
               </a:ext>
             </a:extLst>
           </p:cNvPr>
@@ -4348,24 +4733,52 @@
           <a:p>
             <a:r>
               <a:rPr lang="en-US" dirty="0"/>
-              <a:t>Compare means of different features across both years, including </a:t>
+              <a:t>Methods used for feature selection (Lasso, VIF, SFS)</a:t>
+            </a:r>
+          </a:p>
+          <a:p>
+            <a:r>
+              <a:rPr lang="en-US" dirty="0"/>
+              <a:t>Due to multicollinearity issues, VIF and Lasso were unnecessary</a:t>
+            </a:r>
+          </a:p>
+          <a:p>
+            <a:r>
+              <a:rPr lang="en-US" dirty="0"/>
+              <a:t>Chose to use ensemble techniques that can handle multicollinearity</a:t>
+            </a:r>
+          </a:p>
+          <a:p>
+            <a:r>
+              <a:rPr lang="en-US" dirty="0"/>
+              <a:t>Thus SFS was used as a greedy process, both </a:t>
             </a:r>
             <a:r>
               <a:rPr lang="en-US" dirty="0" err="1"/>
-              <a:t>SalePrice</a:t>
-            </a:r>
-            <a:endParaRPr lang="en-US" dirty="0"/>
-          </a:p>
-          <a:p>
-            <a:r>
-              <a:rPr lang="en-US" dirty="0"/>
-              <a:t>Assess how the market may have changed due to the Pandemic</a:t>
-            </a:r>
-          </a:p>
-          <a:p>
-            <a:endParaRPr lang="en-US" dirty="0"/>
-          </a:p>
-          <a:p>
+              <a:t>fwd</a:t>
+            </a:r>
+            <a:r>
+              <a:rPr lang="en-US" dirty="0"/>
+              <a:t> and </a:t>
+            </a:r>
+            <a:r>
+              <a:rPr lang="en-US" dirty="0" err="1"/>
+              <a:t>bwd</a:t>
+            </a:r>
+            <a:r>
+              <a:rPr lang="en-US" dirty="0"/>
+              <a:t>, which resulted in 37 features selected for the final model</a:t>
+            </a:r>
+          </a:p>
+          <a:p>
+            <a:r>
+              <a:rPr lang="en-US" dirty="0"/>
+              <a:t>Describe the important features in some way using a diagram or list of correlation/</a:t>
+            </a:r>
+            <a:r>
+              <a:rPr lang="en-US" dirty="0" err="1"/>
+              <a:t>importances</a:t>
+            </a:r>
             <a:endParaRPr lang="en-US" dirty="0"/>
           </a:p>
         </p:txBody>
@@ -4373,7 +4786,7 @@
     </p:spTree>
     <p:extLst>
       <p:ext uri="{BB962C8B-B14F-4D97-AF65-F5344CB8AC3E}">
-        <p14:creationId xmlns:p14="http://schemas.microsoft.com/office/powerpoint/2010/main" val="1846207843"/>
+        <p14:creationId xmlns:p14="http://schemas.microsoft.com/office/powerpoint/2010/main" val="793378892"/>
       </p:ext>
     </p:extLst>
   </p:cSld>
@@ -4405,7 +4818,7 @@
           <p:cNvPr id="2" name="Title 1">
             <a:extLst>
               <a:ext uri="{FF2B5EF4-FFF2-40B4-BE49-F238E27FC236}">
-                <a16:creationId xmlns:a16="http://schemas.microsoft.com/office/drawing/2014/main" id="{4F04B741-627B-A993-7B96-1CFFB8638CDD}"/>
+                <a16:creationId xmlns:a16="http://schemas.microsoft.com/office/drawing/2014/main" id="{A75C7817-1BFF-C9E7-63CC-91790F745067}"/>
               </a:ext>
             </a:extLst>
           </p:cNvPr>
@@ -4423,7 +4836,7 @@
           <a:p>
             <a:r>
               <a:rPr lang="en-US" dirty="0"/>
-              <a:t>Final Model selection Section</a:t>
+              <a:t>Compare 2019 to 2021</a:t>
             </a:r>
           </a:p>
         </p:txBody>
@@ -4433,7 +4846,7 @@
           <p:cNvPr id="3" name="Content Placeholder 2">
             <a:extLst>
               <a:ext uri="{FF2B5EF4-FFF2-40B4-BE49-F238E27FC236}">
-                <a16:creationId xmlns:a16="http://schemas.microsoft.com/office/drawing/2014/main" id="{CBEBB159-5ADF-4611-D580-8D26899DA560}"/>
+                <a16:creationId xmlns:a16="http://schemas.microsoft.com/office/drawing/2014/main" id="{B97B878B-CD2C-B39F-AFE7-28C09C352DFB}"/>
               </a:ext>
             </a:extLst>
           </p:cNvPr>
@@ -4451,52 +4864,46 @@
           <a:p>
             <a:r>
               <a:rPr lang="en-US" dirty="0"/>
-              <a:t>Describe what models were tried (Linear, </a:t>
+              <a:t>Compare means of different features across both years, including </a:t>
             </a:r>
             <a:r>
               <a:rPr lang="en-US" dirty="0" err="1"/>
-              <a:t>RandomForest</a:t>
-            </a:r>
-            <a:r>
-              <a:rPr lang="en-US" dirty="0"/>
-              <a:t>, Support Vector Regression, </a:t>
+              <a:t>SalePrice</a:t>
+            </a:r>
+            <a:endParaRPr lang="en-US" dirty="0"/>
+          </a:p>
+          <a:p>
+            <a:r>
+              <a:rPr lang="en-US" dirty="0"/>
+              <a:t>Assess how the market may have changed due to the Pandemic</a:t>
+            </a:r>
+          </a:p>
+          <a:p>
+            <a:r>
+              <a:rPr lang="en-US" dirty="0"/>
+              <a:t>Add visualizations (map comparisons, AB testing table, hypothesis testing table </a:t>
             </a:r>
             <a:r>
               <a:rPr lang="en-US" dirty="0" err="1"/>
-              <a:t>GradientBoosting</a:t>
-            </a:r>
-            <a:r>
-              <a:rPr lang="en-US" dirty="0"/>
-              <a:t>)</a:t>
-            </a:r>
-          </a:p>
-          <a:p>
-            <a:r>
-              <a:rPr lang="en-US" dirty="0"/>
-              <a:t>Found that </a:t>
-            </a:r>
-            <a:r>
-              <a:rPr lang="en-US" dirty="0" err="1"/>
-              <a:t>GradientBoosting</a:t>
-            </a:r>
-            <a:r>
-              <a:rPr lang="en-US" dirty="0"/>
-              <a:t> was the </a:t>
-            </a:r>
-            <a:r>
-              <a:rPr lang="en-US"/>
-              <a:t>best model with R^2 of ~89%</a:t>
-            </a:r>
-          </a:p>
-          <a:p>
-            <a:endParaRPr lang="en-US"/>
+              <a:t>etc</a:t>
+            </a:r>
+            <a:r>
+              <a:rPr lang="en-US" dirty="0"/>
+              <a:t>…)</a:t>
+            </a:r>
+          </a:p>
+          <a:p>
+            <a:endParaRPr lang="en-US" dirty="0"/>
+          </a:p>
+          <a:p>
+            <a:endParaRPr lang="en-US" dirty="0"/>
           </a:p>
         </p:txBody>
       </p:sp>
     </p:spTree>
     <p:extLst>
       <p:ext uri="{BB962C8B-B14F-4D97-AF65-F5344CB8AC3E}">
-        <p14:creationId xmlns:p14="http://schemas.microsoft.com/office/powerpoint/2010/main" val="990921834"/>
+        <p14:creationId xmlns:p14="http://schemas.microsoft.com/office/powerpoint/2010/main" val="1846207843"/>
       </p:ext>
     </p:extLst>
   </p:cSld>

</xml_diff>